<commit_message>
Minor edit to developer guide.
</commit_message>
<xml_diff>
--- a/docs/diagrams/UiComponentClassDiagram.pptx
+++ b/docs/diagrams/UiComponentClassDiagram.pptx
@@ -208,7 +208,7 @@
           <a:p>
             <a:fld id="{F5CC4B3F-88C1-4FFA-B1B6-F41C21DC6924}" type="datetimeFigureOut">
               <a:rPr lang="en-US" smtClean="0"/>
-              <a:t>1/7/2017</a:t>
+              <a:t>7/11/2017</a:t>
             </a:fld>
             <a:endParaRPr lang="en-US"/>
           </a:p>
@@ -654,7 +654,7 @@
           <a:p>
             <a:fld id="{78C97017-6FC3-485B-9764-EAC9E56C1D49}" type="datetimeFigureOut">
               <a:rPr lang="en-US" smtClean="0"/>
-              <a:t>1/7/2017</a:t>
+              <a:t>7/11/2017</a:t>
             </a:fld>
             <a:endParaRPr lang="en-US"/>
           </a:p>
@@ -822,7 +822,7 @@
           <a:p>
             <a:fld id="{78C97017-6FC3-485B-9764-EAC9E56C1D49}" type="datetimeFigureOut">
               <a:rPr lang="en-US" smtClean="0"/>
-              <a:t>1/7/2017</a:t>
+              <a:t>7/11/2017</a:t>
             </a:fld>
             <a:endParaRPr lang="en-US"/>
           </a:p>
@@ -1000,7 +1000,7 @@
           <a:p>
             <a:fld id="{78C97017-6FC3-485B-9764-EAC9E56C1D49}" type="datetimeFigureOut">
               <a:rPr lang="en-US" smtClean="0"/>
-              <a:t>1/7/2017</a:t>
+              <a:t>7/11/2017</a:t>
             </a:fld>
             <a:endParaRPr lang="en-US"/>
           </a:p>
@@ -1168,7 +1168,7 @@
           <a:p>
             <a:fld id="{78C97017-6FC3-485B-9764-EAC9E56C1D49}" type="datetimeFigureOut">
               <a:rPr lang="en-US" smtClean="0"/>
-              <a:t>1/7/2017</a:t>
+              <a:t>7/11/2017</a:t>
             </a:fld>
             <a:endParaRPr lang="en-US"/>
           </a:p>
@@ -1413,7 +1413,7 @@
           <a:p>
             <a:fld id="{78C97017-6FC3-485B-9764-EAC9E56C1D49}" type="datetimeFigureOut">
               <a:rPr lang="en-US" smtClean="0"/>
-              <a:t>1/7/2017</a:t>
+              <a:t>7/11/2017</a:t>
             </a:fld>
             <a:endParaRPr lang="en-US"/>
           </a:p>
@@ -1698,7 +1698,7 @@
           <a:p>
             <a:fld id="{78C97017-6FC3-485B-9764-EAC9E56C1D49}" type="datetimeFigureOut">
               <a:rPr lang="en-US" smtClean="0"/>
-              <a:t>1/7/2017</a:t>
+              <a:t>7/11/2017</a:t>
             </a:fld>
             <a:endParaRPr lang="en-US"/>
           </a:p>
@@ -2117,7 +2117,7 @@
           <a:p>
             <a:fld id="{78C97017-6FC3-485B-9764-EAC9E56C1D49}" type="datetimeFigureOut">
               <a:rPr lang="en-US" smtClean="0"/>
-              <a:t>1/7/2017</a:t>
+              <a:t>7/11/2017</a:t>
             </a:fld>
             <a:endParaRPr lang="en-US"/>
           </a:p>
@@ -2234,7 +2234,7 @@
           <a:p>
             <a:fld id="{78C97017-6FC3-485B-9764-EAC9E56C1D49}" type="datetimeFigureOut">
               <a:rPr lang="en-US" smtClean="0"/>
-              <a:t>1/7/2017</a:t>
+              <a:t>7/11/2017</a:t>
             </a:fld>
             <a:endParaRPr lang="en-US"/>
           </a:p>
@@ -2329,7 +2329,7 @@
           <a:p>
             <a:fld id="{78C97017-6FC3-485B-9764-EAC9E56C1D49}" type="datetimeFigureOut">
               <a:rPr lang="en-US" smtClean="0"/>
-              <a:t>1/7/2017</a:t>
+              <a:t>7/11/2017</a:t>
             </a:fld>
             <a:endParaRPr lang="en-US"/>
           </a:p>
@@ -2604,7 +2604,7 @@
           <a:p>
             <a:fld id="{78C97017-6FC3-485B-9764-EAC9E56C1D49}" type="datetimeFigureOut">
               <a:rPr lang="en-US" smtClean="0"/>
-              <a:t>1/7/2017</a:t>
+              <a:t>7/11/2017</a:t>
             </a:fld>
             <a:endParaRPr lang="en-US"/>
           </a:p>
@@ -2856,7 +2856,7 @@
           <a:p>
             <a:fld id="{78C97017-6FC3-485B-9764-EAC9E56C1D49}" type="datetimeFigureOut">
               <a:rPr lang="en-US" smtClean="0"/>
-              <a:t>1/7/2017</a:t>
+              <a:t>7/11/2017</a:t>
             </a:fld>
             <a:endParaRPr lang="en-US"/>
           </a:p>
@@ -3067,7 +3067,7 @@
           <a:p>
             <a:fld id="{78C97017-6FC3-485B-9764-EAC9E56C1D49}" type="datetimeFigureOut">
               <a:rPr lang="en-US" smtClean="0"/>
-              <a:t>1/7/2017</a:t>
+              <a:t>7/11/2017</a:t>
             </a:fld>
             <a:endParaRPr lang="en-US"/>
           </a:p>
@@ -4098,14 +4098,14 @@
           <a:p>
             <a:pPr algn="ctr"/>
             <a:r>
-              <a:rPr lang="en-US" sz="1050" b="1" dirty="0" err="1">
+              <a:rPr lang="en-US" sz="1050" b="1">
                 <a:solidFill>
                   <a:schemeClr val="accent3">
                     <a:lumMod val="75000"/>
                   </a:schemeClr>
                 </a:solidFill>
               </a:rPr>
-              <a:t>PersonCard</a:t>
+              <a:t>TaskCard</a:t>
             </a:r>
             <a:endParaRPr lang="en-SG" sz="1050" b="1" dirty="0">
               <a:solidFill>

</xml_diff>